<commit_message>
Updated notebooks and ppts.
</commit_message>
<xml_diff>
--- a/Machine_Learning.pptx
+++ b/Machine_Learning.pptx
@@ -5,7 +5,7 @@
     <p:sldMasterId id="2147483648" r:id="rId1"/>
   </p:sldMasterIdLst>
   <p:notesMasterIdLst>
-    <p:notesMasterId r:id="rId28"/>
+    <p:notesMasterId r:id="rId29"/>
   </p:notesMasterIdLst>
   <p:sldIdLst>
     <p:sldId id="256" r:id="rId2"/>
@@ -21,19 +21,20 @@
     <p:sldId id="261" r:id="rId12"/>
     <p:sldId id="265" r:id="rId13"/>
     <p:sldId id="279" r:id="rId14"/>
-    <p:sldId id="280" r:id="rId15"/>
-    <p:sldId id="286" r:id="rId16"/>
-    <p:sldId id="281" r:id="rId17"/>
-    <p:sldId id="264" r:id="rId18"/>
-    <p:sldId id="263" r:id="rId19"/>
-    <p:sldId id="274" r:id="rId20"/>
-    <p:sldId id="266" r:id="rId21"/>
-    <p:sldId id="267" r:id="rId22"/>
-    <p:sldId id="270" r:id="rId23"/>
-    <p:sldId id="272" r:id="rId24"/>
-    <p:sldId id="273" r:id="rId25"/>
-    <p:sldId id="287" r:id="rId26"/>
-    <p:sldId id="278" r:id="rId27"/>
+    <p:sldId id="288" r:id="rId15"/>
+    <p:sldId id="280" r:id="rId16"/>
+    <p:sldId id="286" r:id="rId17"/>
+    <p:sldId id="281" r:id="rId18"/>
+    <p:sldId id="264" r:id="rId19"/>
+    <p:sldId id="263" r:id="rId20"/>
+    <p:sldId id="274" r:id="rId21"/>
+    <p:sldId id="266" r:id="rId22"/>
+    <p:sldId id="267" r:id="rId23"/>
+    <p:sldId id="270" r:id="rId24"/>
+    <p:sldId id="272" r:id="rId25"/>
+    <p:sldId id="273" r:id="rId26"/>
+    <p:sldId id="287" r:id="rId27"/>
+    <p:sldId id="278" r:id="rId28"/>
   </p:sldIdLst>
   <p:sldSz cx="12192000" cy="6858000"/>
   <p:notesSz cx="6858000" cy="9144000"/>
@@ -133,6 +134,41 @@
     </a:lvl9pPr>
   </p:defaultTextStyle>
   <p:extLst>
+    <p:ext uri="{521415D9-36F7-43E2-AB2F-B90AF26B5E84}">
+      <p14:sectionLst xmlns:p14="http://schemas.microsoft.com/office/powerpoint/2010/main">
+        <p14:section name="Default Section" id="{EC1F0AA3-0586-5543-A09C-E39485A91136}">
+          <p14:sldIdLst>
+            <p14:sldId id="256"/>
+            <p14:sldId id="268"/>
+            <p14:sldId id="283"/>
+            <p14:sldId id="269"/>
+            <p14:sldId id="257"/>
+            <p14:sldId id="284"/>
+            <p14:sldId id="282"/>
+            <p14:sldId id="259"/>
+            <p14:sldId id="258"/>
+            <p14:sldId id="260"/>
+            <p14:sldId id="261"/>
+            <p14:sldId id="265"/>
+            <p14:sldId id="279"/>
+            <p14:sldId id="288"/>
+            <p14:sldId id="280"/>
+            <p14:sldId id="286"/>
+            <p14:sldId id="281"/>
+            <p14:sldId id="264"/>
+            <p14:sldId id="263"/>
+            <p14:sldId id="274"/>
+            <p14:sldId id="266"/>
+            <p14:sldId id="267"/>
+            <p14:sldId id="270"/>
+            <p14:sldId id="272"/>
+            <p14:sldId id="273"/>
+            <p14:sldId id="287"/>
+            <p14:sldId id="278"/>
+          </p14:sldIdLst>
+        </p14:section>
+      </p14:sectionLst>
+    </p:ext>
     <p:ext uri="{EFAFB233-063F-42B5-8137-9DF3F51BA10A}">
       <p15:sldGuideLst xmlns:p15="http://schemas.microsoft.com/office/powerpoint/2012/main"/>
     </p:ext>
@@ -3801,7 +3837,7 @@
           <a:p>
             <a:fld id="{62323782-2362-0440-8C4A-61387DA68252}" type="datetimeFigureOut">
               <a:rPr lang="en-US" smtClean="0"/>
-              <a:t>3/19/17</a:t>
+              <a:t>4/2/17</a:t>
             </a:fld>
             <a:endParaRPr lang="en-US"/>
           </a:p>
@@ -4306,7 +4342,7 @@
           <a:p>
             <a:fld id="{13D9ECC9-2F1C-444E-A696-C5A4216D0043}" type="datetimeFigureOut">
               <a:rPr lang="en-US" smtClean="0"/>
-              <a:t>3/19/17</a:t>
+              <a:t>4/2/17</a:t>
             </a:fld>
             <a:endParaRPr lang="en-US"/>
           </a:p>
@@ -4476,7 +4512,7 @@
           <a:p>
             <a:fld id="{13D9ECC9-2F1C-444E-A696-C5A4216D0043}" type="datetimeFigureOut">
               <a:rPr lang="en-US" smtClean="0"/>
-              <a:t>3/19/17</a:t>
+              <a:t>4/2/17</a:t>
             </a:fld>
             <a:endParaRPr lang="en-US"/>
           </a:p>
@@ -4656,7 +4692,7 @@
           <a:p>
             <a:fld id="{13D9ECC9-2F1C-444E-A696-C5A4216D0043}" type="datetimeFigureOut">
               <a:rPr lang="en-US" smtClean="0"/>
-              <a:t>3/19/17</a:t>
+              <a:t>4/2/17</a:t>
             </a:fld>
             <a:endParaRPr lang="en-US"/>
           </a:p>
@@ -4826,7 +4862,7 @@
           <a:p>
             <a:fld id="{13D9ECC9-2F1C-444E-A696-C5A4216D0043}" type="datetimeFigureOut">
               <a:rPr lang="en-US" smtClean="0"/>
-              <a:t>3/19/17</a:t>
+              <a:t>4/2/17</a:t>
             </a:fld>
             <a:endParaRPr lang="en-US"/>
           </a:p>
@@ -5072,7 +5108,7 @@
           <a:p>
             <a:fld id="{13D9ECC9-2F1C-444E-A696-C5A4216D0043}" type="datetimeFigureOut">
               <a:rPr lang="en-US" smtClean="0"/>
-              <a:t>3/19/17</a:t>
+              <a:t>4/2/17</a:t>
             </a:fld>
             <a:endParaRPr lang="en-US"/>
           </a:p>
@@ -5304,7 +5340,7 @@
           <a:p>
             <a:fld id="{13D9ECC9-2F1C-444E-A696-C5A4216D0043}" type="datetimeFigureOut">
               <a:rPr lang="en-US" smtClean="0"/>
-              <a:t>3/19/17</a:t>
+              <a:t>4/2/17</a:t>
             </a:fld>
             <a:endParaRPr lang="en-US"/>
           </a:p>
@@ -5671,7 +5707,7 @@
           <a:p>
             <a:fld id="{13D9ECC9-2F1C-444E-A696-C5A4216D0043}" type="datetimeFigureOut">
               <a:rPr lang="en-US" smtClean="0"/>
-              <a:t>3/19/17</a:t>
+              <a:t>4/2/17</a:t>
             </a:fld>
             <a:endParaRPr lang="en-US"/>
           </a:p>
@@ -5789,7 +5825,7 @@
           <a:p>
             <a:fld id="{13D9ECC9-2F1C-444E-A696-C5A4216D0043}" type="datetimeFigureOut">
               <a:rPr lang="en-US" smtClean="0"/>
-              <a:t>3/19/17</a:t>
+              <a:t>4/2/17</a:t>
             </a:fld>
             <a:endParaRPr lang="en-US"/>
           </a:p>
@@ -5884,7 +5920,7 @@
           <a:p>
             <a:fld id="{13D9ECC9-2F1C-444E-A696-C5A4216D0043}" type="datetimeFigureOut">
               <a:rPr lang="en-US" smtClean="0"/>
-              <a:t>3/19/17</a:t>
+              <a:t>4/2/17</a:t>
             </a:fld>
             <a:endParaRPr lang="en-US"/>
           </a:p>
@@ -6161,7 +6197,7 @@
           <a:p>
             <a:fld id="{13D9ECC9-2F1C-444E-A696-C5A4216D0043}" type="datetimeFigureOut">
               <a:rPr lang="en-US" smtClean="0"/>
-              <a:t>3/19/17</a:t>
+              <a:t>4/2/17</a:t>
             </a:fld>
             <a:endParaRPr lang="en-US"/>
           </a:p>
@@ -6414,7 +6450,7 @@
           <a:p>
             <a:fld id="{13D9ECC9-2F1C-444E-A696-C5A4216D0043}" type="datetimeFigureOut">
               <a:rPr lang="en-US" smtClean="0"/>
-              <a:t>3/19/17</a:t>
+              <a:t>4/2/17</a:t>
             </a:fld>
             <a:endParaRPr lang="en-US"/>
           </a:p>
@@ -6627,7 +6663,7 @@
           <a:p>
             <a:fld id="{13D9ECC9-2F1C-444E-A696-C5A4216D0043}" type="datetimeFigureOut">
               <a:rPr lang="en-US" smtClean="0"/>
-              <a:t>3/19/17</a:t>
+              <a:t>4/2/17</a:t>
             </a:fld>
             <a:endParaRPr lang="en-US"/>
           </a:p>
@@ -7312,12 +7348,13 @@
             <a:pPr lvl="2"/>
             <a:r>
               <a:rPr lang="en-US" dirty="0"/>
-              <a:t>Regression: Given a picture of a person, we have to predict their age on the basis of the given </a:t>
+              <a:t>Regression: </a:t>
             </a:r>
             <a:r>
               <a:rPr lang="en-US" dirty="0" smtClean="0"/>
-              <a:t>picture.</a:t>
-            </a:r>
+              <a:t>Given various attributes for a house, predict its price</a:t>
+            </a:r>
+            <a:endParaRPr lang="en-US" dirty="0" smtClean="0"/>
           </a:p>
           <a:p>
             <a:pPr lvl="2"/>
@@ -7349,13 +7386,45 @@
             <a:pPr lvl="2"/>
             <a:r>
               <a:rPr lang="en-US" dirty="0" smtClean="0"/>
-              <a:t>Non-clustering: Separating voices from a chaotic environment </a:t>
-            </a:r>
-            <a:r>
-              <a:rPr lang="en-US" smtClean="0"/>
-              <a:t>(cocktail party problem)</a:t>
-            </a:r>
-            <a:endParaRPr lang="en-US" dirty="0" smtClean="0"/>
+              <a:t>Non-clustering: Separating voices from a chaotic environment (cocktail party problem</a:t>
+            </a:r>
+            <a:r>
+              <a:rPr lang="en-US" dirty="0" smtClean="0"/>
+              <a:t>)</a:t>
+            </a:r>
+          </a:p>
+          <a:p>
+            <a:pPr lvl="1"/>
+            <a:r>
+              <a:rPr lang="en-US" dirty="0">
+                <a:solidFill>
+                  <a:schemeClr val="bg2">
+                    <a:lumMod val="50000"/>
+                  </a:schemeClr>
+                </a:solidFill>
+              </a:rPr>
+              <a:t>Reinforcement </a:t>
+            </a:r>
+            <a:r>
+              <a:rPr lang="en-US" dirty="0" smtClean="0">
+                <a:solidFill>
+                  <a:schemeClr val="bg2">
+                    <a:lumMod val="50000"/>
+                  </a:schemeClr>
+                </a:solidFill>
+              </a:rPr>
+              <a:t>learning</a:t>
+            </a:r>
+          </a:p>
+          <a:p>
+            <a:pPr lvl="2"/>
+            <a:endParaRPr lang="en-US" dirty="0">
+              <a:solidFill>
+                <a:schemeClr val="bg2">
+                  <a:lumMod val="50000"/>
+                </a:schemeClr>
+              </a:solidFill>
+            </a:endParaRPr>
           </a:p>
         </p:txBody>
       </p:sp>
@@ -7446,11 +7515,7 @@
           <a:p>
             <a:r>
               <a:rPr lang="en-US" dirty="0" smtClean="0"/>
-              <a:t>Supervised </a:t>
-            </a:r>
-            <a:r>
-              <a:rPr lang="en-US" dirty="0" smtClean="0"/>
-              <a:t>Learning (classification)</a:t>
+              <a:t>Supervised Learning (classification)</a:t>
             </a:r>
             <a:endParaRPr lang="en-US" dirty="0"/>
           </a:p>
@@ -7532,6 +7597,107 @@
             <p:ph type="title"/>
           </p:nvPr>
         </p:nvSpPr>
+        <p:spPr>
+          <a:xfrm>
+            <a:off x="838200" y="365125"/>
+            <a:ext cx="10515600" cy="600075"/>
+          </a:xfrm>
+        </p:spPr>
+        <p:txBody>
+          <a:bodyPr>
+            <a:normAutofit fontScale="90000"/>
+          </a:bodyPr>
+          <a:lstStyle/>
+          <a:p>
+            <a:r>
+              <a:rPr lang="en-US" dirty="0" smtClean="0"/>
+              <a:t>Supervised Learning </a:t>
+            </a:r>
+            <a:r>
+              <a:rPr lang="en-US" dirty="0" smtClean="0"/>
+              <a:t>(Regression)</a:t>
+            </a:r>
+            <a:endParaRPr lang="en-US" dirty="0"/>
+          </a:p>
+        </p:txBody>
+      </p:sp>
+      <p:pic>
+        <p:nvPicPr>
+          <p:cNvPr id="3" name="Picture 2"/>
+          <p:cNvPicPr>
+            <a:picLocks noChangeAspect="1"/>
+          </p:cNvPicPr>
+          <p:nvPr/>
+        </p:nvPicPr>
+        <p:blipFill>
+          <a:blip r:embed="rId2">
+            <a:extLst>
+              <a:ext uri="{28A0092B-C50C-407E-A947-70E740481C1C}">
+                <a14:useLocalDpi xmlns:a14="http://schemas.microsoft.com/office/drawing/2010/main" val="0"/>
+              </a:ext>
+            </a:extLst>
+          </a:blip>
+          <a:stretch>
+            <a:fillRect/>
+          </a:stretch>
+        </p:blipFill>
+        <p:spPr>
+          <a:xfrm>
+            <a:off x="838200" y="1705882"/>
+            <a:ext cx="8892536" cy="4136884"/>
+          </a:xfrm>
+          <a:prstGeom prst="rect">
+            <a:avLst/>
+          </a:prstGeom>
+        </p:spPr>
+      </p:pic>
+    </p:spTree>
+    <p:extLst>
+      <p:ext uri="{BB962C8B-B14F-4D97-AF65-F5344CB8AC3E}">
+        <p14:creationId xmlns:p14="http://schemas.microsoft.com/office/powerpoint/2010/main" val="502559057"/>
+      </p:ext>
+    </p:extLst>
+  </p:cSld>
+  <p:clrMapOvr>
+    <a:masterClrMapping/>
+  </p:clrMapOvr>
+  <p:timing>
+    <p:tnLst>
+      <p:par>
+        <p:cTn id="1" dur="indefinite" restart="never" nodeType="tmRoot"/>
+      </p:par>
+    </p:tnLst>
+  </p:timing>
+</p:sld>
+</file>
+
+<file path=ppt/slides/slide15.xml><?xml version="1.0" encoding="utf-8"?>
+<p:sld xmlns:a="http://schemas.openxmlformats.org/drawingml/2006/main" xmlns:r="http://schemas.openxmlformats.org/officeDocument/2006/relationships" xmlns:p="http://schemas.openxmlformats.org/presentationml/2006/main">
+  <p:cSld>
+    <p:spTree>
+      <p:nvGrpSpPr>
+        <p:cNvPr id="1" name=""/>
+        <p:cNvGrpSpPr/>
+        <p:nvPr/>
+      </p:nvGrpSpPr>
+      <p:grpSpPr>
+        <a:xfrm>
+          <a:off x="0" y="0"/>
+          <a:ext cx="0" cy="0"/>
+          <a:chOff x="0" y="0"/>
+          <a:chExt cx="0" cy="0"/>
+        </a:xfrm>
+      </p:grpSpPr>
+      <p:sp>
+        <p:nvSpPr>
+          <p:cNvPr id="2" name="Title 1"/>
+          <p:cNvSpPr>
+            <a:spLocks noGrp="1"/>
+          </p:cNvSpPr>
+          <p:nvPr>
+            <p:ph type="title"/>
+          </p:nvPr>
+        </p:nvSpPr>
         <p:spPr/>
         <p:txBody>
           <a:bodyPr/>
@@ -7553,7 +7719,6 @@
               <a:rPr lang="en-US" dirty="0"/>
               <a:t>)</a:t>
             </a:r>
-            <a:endParaRPr lang="en-US" dirty="0"/>
           </a:p>
         </p:txBody>
       </p:sp>
@@ -7606,63 +7771,6 @@
 </p:sld>
 </file>
 
-<file path=ppt/slides/slide15.xml><?xml version="1.0" encoding="utf-8"?>
-<p:sld xmlns:a="http://schemas.openxmlformats.org/drawingml/2006/main" xmlns:r="http://schemas.openxmlformats.org/officeDocument/2006/relationships" xmlns:p="http://schemas.openxmlformats.org/presentationml/2006/main">
-  <p:cSld>
-    <p:spTree>
-      <p:nvGrpSpPr>
-        <p:cNvPr id="1" name=""/>
-        <p:cNvGrpSpPr/>
-        <p:nvPr/>
-      </p:nvGrpSpPr>
-      <p:grpSpPr>
-        <a:xfrm>
-          <a:off x="0" y="0"/>
-          <a:ext cx="0" cy="0"/>
-          <a:chOff x="0" y="0"/>
-          <a:chExt cx="0" cy="0"/>
-        </a:xfrm>
-      </p:grpSpPr>
-      <p:sp>
-        <p:nvSpPr>
-          <p:cNvPr id="2" name="Title 1"/>
-          <p:cNvSpPr>
-            <a:spLocks noGrp="1"/>
-          </p:cNvSpPr>
-          <p:nvPr>
-            <p:ph type="title"/>
-          </p:nvPr>
-        </p:nvSpPr>
-        <p:spPr/>
-        <p:txBody>
-          <a:bodyPr/>
-          <a:lstStyle/>
-          <a:p>
-            <a:pPr algn="ctr"/>
-            <a:r>
-              <a:rPr lang="en-US" dirty="0" smtClean="0"/>
-              <a:t>Demo</a:t>
-            </a:r>
-            <a:br>
-              <a:rPr lang="en-US" dirty="0" smtClean="0"/>
-            </a:br>
-            <a:endParaRPr lang="en-US" dirty="0"/>
-          </a:p>
-        </p:txBody>
-      </p:sp>
-    </p:spTree>
-    <p:extLst>
-      <p:ext uri="{BB962C8B-B14F-4D97-AF65-F5344CB8AC3E}">
-        <p14:creationId xmlns:p14="http://schemas.microsoft.com/office/powerpoint/2010/main" val="1103846380"/>
-      </p:ext>
-    </p:extLst>
-  </p:cSld>
-  <p:clrMapOvr>
-    <a:masterClrMapping/>
-  </p:clrMapOvr>
-</p:sld>
-</file>
-
 <file path=ppt/slides/slide16.xml><?xml version="1.0" encoding="utf-8"?>
 <p:sld xmlns:a="http://schemas.openxmlformats.org/drawingml/2006/main" xmlns:r="http://schemas.openxmlformats.org/officeDocument/2006/relationships" xmlns:p="http://schemas.openxmlformats.org/presentationml/2006/main">
   <p:cSld>
@@ -7695,39 +7803,14 @@
           <a:bodyPr/>
           <a:lstStyle/>
           <a:p>
+            <a:pPr algn="ctr"/>
             <a:r>
               <a:rPr lang="en-US" dirty="0" smtClean="0"/>
-              <a:t>Model Validation</a:t>
-            </a:r>
-            <a:endParaRPr lang="en-US" dirty="0"/>
-          </a:p>
-        </p:txBody>
-      </p:sp>
-      <p:sp>
-        <p:nvSpPr>
-          <p:cNvPr id="3" name="Content Placeholder 2"/>
-          <p:cNvSpPr>
-            <a:spLocks noGrp="1"/>
-          </p:cNvSpPr>
-          <p:nvPr>
-            <p:ph idx="1"/>
-          </p:nvPr>
-        </p:nvSpPr>
-        <p:spPr/>
-        <p:txBody>
-          <a:bodyPr/>
-          <a:lstStyle/>
-          <a:p>
-            <a:r>
+              <a:t>Demo</a:t>
+            </a:r>
+            <a:br>
               <a:rPr lang="en-US" dirty="0" smtClean="0"/>
-              <a:t>Precision, Recall, Support</a:t>
-            </a:r>
-          </a:p>
-          <a:p>
-            <a:r>
-              <a:rPr lang="en-US" dirty="0" smtClean="0"/>
-              <a:t>K-Fold cross validation</a:t>
-            </a:r>
+            </a:br>
             <a:endParaRPr lang="en-US" dirty="0"/>
           </a:p>
         </p:txBody>
@@ -7735,20 +7818,13 @@
     </p:spTree>
     <p:extLst>
       <p:ext uri="{BB962C8B-B14F-4D97-AF65-F5344CB8AC3E}">
-        <p14:creationId xmlns:p14="http://schemas.microsoft.com/office/powerpoint/2010/main" val="2071254130"/>
+        <p14:creationId xmlns:p14="http://schemas.microsoft.com/office/powerpoint/2010/main" val="1103846380"/>
       </p:ext>
     </p:extLst>
   </p:cSld>
   <p:clrMapOvr>
     <a:masterClrMapping/>
   </p:clrMapOvr>
-  <p:timing>
-    <p:tnLst>
-      <p:par>
-        <p:cTn id="1" dur="indefinite" restart="never" nodeType="tmRoot"/>
-      </p:par>
-    </p:tnLst>
-  </p:timing>
 </p:sld>
 </file>
 
@@ -7786,7 +7862,7 @@
           <a:p>
             <a:r>
               <a:rPr lang="en-US" dirty="0" smtClean="0"/>
-              <a:t>Data Wrangling</a:t>
+              <a:t>Model Validation</a:t>
             </a:r>
             <a:endParaRPr lang="en-US" dirty="0"/>
           </a:p>
@@ -7809,38 +7885,13 @@
           <a:p>
             <a:r>
               <a:rPr lang="en-US" dirty="0" smtClean="0"/>
-              <a:t>Data acquisition</a:t>
-            </a:r>
-          </a:p>
-          <a:p>
-            <a:pPr lvl="1"/>
+              <a:t>Precision, Recall, Support</a:t>
+            </a:r>
+          </a:p>
+          <a:p>
             <a:r>
               <a:rPr lang="en-US" dirty="0" smtClean="0"/>
-              <a:t>Get the relevant data which will help you to solve your problem</a:t>
-            </a:r>
-          </a:p>
-          <a:p>
-            <a:pPr lvl="1"/>
-            <a:endParaRPr lang="en-US" dirty="0" smtClean="0"/>
-          </a:p>
-          <a:p>
-            <a:r>
-              <a:rPr lang="en-US" dirty="0" smtClean="0"/>
-              <a:t>Data cleaning</a:t>
-            </a:r>
-          </a:p>
-          <a:p>
-            <a:pPr lvl="1"/>
-            <a:r>
-              <a:rPr lang="en-US" dirty="0" smtClean="0"/>
-              <a:t>Sanity checking</a:t>
-            </a:r>
-          </a:p>
-          <a:p>
-            <a:pPr lvl="1"/>
-            <a:r>
-              <a:rPr lang="en-US" dirty="0" smtClean="0"/>
-              <a:t>Addressing missing values</a:t>
+              <a:t>K-Fold cross validation</a:t>
             </a:r>
             <a:endParaRPr lang="en-US" dirty="0"/>
           </a:p>
@@ -7849,7 +7900,7 @@
     </p:spTree>
     <p:extLst>
       <p:ext uri="{BB962C8B-B14F-4D97-AF65-F5344CB8AC3E}">
-        <p14:creationId xmlns:p14="http://schemas.microsoft.com/office/powerpoint/2010/main" val="664247816"/>
+        <p14:creationId xmlns:p14="http://schemas.microsoft.com/office/powerpoint/2010/main" val="2071254130"/>
       </p:ext>
     </p:extLst>
   </p:cSld>
@@ -7900,7 +7951,7 @@
           <a:p>
             <a:r>
               <a:rPr lang="en-US" dirty="0" smtClean="0"/>
-              <a:t>Data Acquisition	</a:t>
+              <a:t>Data Wrangling</a:t>
             </a:r>
             <a:endParaRPr lang="en-US" dirty="0"/>
           </a:p>
@@ -7923,63 +7974,46 @@
           <a:p>
             <a:r>
               <a:rPr lang="en-US" dirty="0" smtClean="0"/>
-              <a:t>Can be acquired from various sources</a:t>
+              <a:t>Data acquisition</a:t>
             </a:r>
           </a:p>
           <a:p>
             <a:pPr lvl="1"/>
             <a:r>
               <a:rPr lang="en-US" dirty="0" smtClean="0"/>
-              <a:t>FTP/SFTP</a:t>
+              <a:t>Get the relevant data which will help you to solve your problem</a:t>
             </a:r>
           </a:p>
           <a:p>
             <a:pPr lvl="1"/>
+            <a:endParaRPr lang="en-US" dirty="0" smtClean="0"/>
+          </a:p>
+          <a:p>
             <a:r>
               <a:rPr lang="en-US" dirty="0" smtClean="0"/>
-              <a:t>Scraping webpages</a:t>
+              <a:t>Data cleaning</a:t>
             </a:r>
           </a:p>
           <a:p>
             <a:pPr lvl="1"/>
             <a:r>
               <a:rPr lang="en-US" dirty="0" smtClean="0"/>
-              <a:t>Databases</a:t>
+              <a:t>Sanity checking</a:t>
             </a:r>
           </a:p>
           <a:p>
             <a:pPr lvl="1"/>
             <a:r>
               <a:rPr lang="en-US" dirty="0" smtClean="0"/>
-              <a:t>API</a:t>
-            </a:r>
-          </a:p>
-          <a:p>
+              <a:t>Addressing missing </a:t>
+            </a:r>
             <a:r>
               <a:rPr lang="en-US" dirty="0" smtClean="0"/>
-              <a:t>Can be of various formats</a:t>
+              <a:t>values</a:t>
             </a:r>
           </a:p>
           <a:p>
             <a:pPr lvl="1"/>
-            <a:r>
-              <a:rPr lang="en-US" dirty="0" smtClean="0"/>
-              <a:t>CSV</a:t>
-            </a:r>
-          </a:p>
-          <a:p>
-            <a:pPr lvl="1"/>
-            <a:r>
-              <a:rPr lang="en-US" dirty="0" smtClean="0"/>
-              <a:t>JSON</a:t>
-            </a:r>
-          </a:p>
-          <a:p>
-            <a:pPr lvl="1"/>
-            <a:r>
-              <a:rPr lang="en-US" dirty="0" smtClean="0"/>
-              <a:t>XML</a:t>
-            </a:r>
             <a:endParaRPr lang="en-US" dirty="0"/>
           </a:p>
         </p:txBody>
@@ -7987,13 +8021,20 @@
     </p:spTree>
     <p:extLst>
       <p:ext uri="{BB962C8B-B14F-4D97-AF65-F5344CB8AC3E}">
-        <p14:creationId xmlns:p14="http://schemas.microsoft.com/office/powerpoint/2010/main" val="1487107883"/>
+        <p14:creationId xmlns:p14="http://schemas.microsoft.com/office/powerpoint/2010/main" val="664247816"/>
       </p:ext>
     </p:extLst>
   </p:cSld>
   <p:clrMapOvr>
     <a:masterClrMapping/>
   </p:clrMapOvr>
+  <p:timing>
+    <p:tnLst>
+      <p:par>
+        <p:cTn id="1" dur="indefinite" restart="never" nodeType="tmRoot"/>
+      </p:par>
+    </p:tnLst>
+  </p:timing>
 </p:sld>
 </file>
 
@@ -8031,7 +8072,7 @@
           <a:p>
             <a:r>
               <a:rPr lang="en-US" dirty="0" smtClean="0"/>
-              <a:t>Data Structure Libraries</a:t>
+              <a:t>Data Acquisition	</a:t>
             </a:r>
             <a:endParaRPr lang="en-US" dirty="0"/>
           </a:p>
@@ -8053,106 +8094,72 @@
           <a:lstStyle/>
           <a:p>
             <a:r>
-              <a:rPr lang="en-US" dirty="0" err="1" smtClean="0"/>
-              <a:t>NumPy</a:t>
-            </a:r>
-            <a:endParaRPr lang="en-US" dirty="0" smtClean="0"/>
+              <a:rPr lang="en-US" dirty="0" smtClean="0"/>
+              <a:t>Can be acquired from various sources</a:t>
+            </a:r>
           </a:p>
           <a:p>
             <a:pPr lvl="1"/>
             <a:r>
               <a:rPr lang="en-US" dirty="0" smtClean="0"/>
-              <a:t>Powerful n-</a:t>
-            </a:r>
-            <a:r>
-              <a:rPr lang="en-US" dirty="0" err="1" smtClean="0"/>
-              <a:t>dimentional</a:t>
-            </a:r>
+              <a:t>FTP/SFTP</a:t>
+            </a:r>
+          </a:p>
+          <a:p>
+            <a:pPr lvl="1"/>
             <a:r>
               <a:rPr lang="en-US" dirty="0" smtClean="0"/>
-              <a:t> array object data </a:t>
-            </a:r>
-            <a:r>
-              <a:rPr lang="en-US" dirty="0" err="1" smtClean="0"/>
-              <a:t>sctructure</a:t>
-            </a:r>
-            <a:endParaRPr lang="en-US" dirty="0" smtClean="0"/>
+              <a:t>Scraping webpages</a:t>
+            </a:r>
           </a:p>
           <a:p>
             <a:pPr lvl="1"/>
             <a:r>
               <a:rPr lang="en-US" dirty="0" smtClean="0"/>
-              <a:t>Utility functions to work with this data structure</a:t>
-            </a:r>
-          </a:p>
-          <a:p>
-            <a:pPr lvl="2"/>
+              <a:t>Databases</a:t>
+            </a:r>
+          </a:p>
+          <a:p>
+            <a:pPr lvl="1"/>
             <a:r>
               <a:rPr lang="en-US" dirty="0" smtClean="0"/>
-              <a:t>Useful </a:t>
-            </a:r>
-            <a:r>
-              <a:rPr lang="en-US" dirty="0"/>
-              <a:t>linear algebra, Fourier transform, and random number </a:t>
-            </a:r>
+              <a:t>API</a:t>
+            </a:r>
+          </a:p>
+          <a:p>
             <a:r>
               <a:rPr lang="en-US" dirty="0" smtClean="0"/>
-              <a:t>capabilities</a:t>
-            </a:r>
-          </a:p>
-          <a:p>
+              <a:t>Can be of various formats</a:t>
+            </a:r>
+          </a:p>
+          <a:p>
+            <a:pPr lvl="1"/>
             <a:r>
               <a:rPr lang="en-US" dirty="0" smtClean="0"/>
-              <a:t>Pandas</a:t>
+              <a:t>CSV</a:t>
             </a:r>
           </a:p>
           <a:p>
             <a:pPr lvl="1"/>
             <a:r>
               <a:rPr lang="en-US" dirty="0" smtClean="0"/>
-              <a:t>Written on the top of </a:t>
-            </a:r>
-            <a:r>
-              <a:rPr lang="en-US" dirty="0" err="1" smtClean="0"/>
-              <a:t>NumPy</a:t>
-            </a:r>
-            <a:endParaRPr lang="en-US" dirty="0" smtClean="0"/>
+              <a:t>JSON</a:t>
+            </a:r>
           </a:p>
           <a:p>
             <a:pPr lvl="1"/>
             <a:r>
               <a:rPr lang="en-US" dirty="0" smtClean="0"/>
-              <a:t>Series as basic data structure</a:t>
-            </a:r>
-          </a:p>
-          <a:p>
-            <a:pPr lvl="1"/>
-            <a:r>
-              <a:rPr lang="en-US" dirty="0" smtClean="0"/>
-              <a:t>Provides data analysis tools</a:t>
-            </a:r>
-          </a:p>
-          <a:p>
-            <a:pPr lvl="2"/>
-            <a:r>
-              <a:rPr lang="en-US" dirty="0"/>
-              <a:t>NA-friendly statistics, </a:t>
-            </a:r>
-            <a:r>
-              <a:rPr lang="en-US" dirty="0" err="1"/>
-              <a:t>groupby</a:t>
-            </a:r>
-            <a:r>
-              <a:rPr lang="en-US" dirty="0"/>
-              <a:t>, merge and join methods, and lots of other conveniences</a:t>
-            </a:r>
+              <a:t>XML</a:t>
+            </a:r>
+            <a:endParaRPr lang="en-US" dirty="0"/>
           </a:p>
         </p:txBody>
       </p:sp>
     </p:spTree>
     <p:extLst>
       <p:ext uri="{BB962C8B-B14F-4D97-AF65-F5344CB8AC3E}">
-        <p14:creationId xmlns:p14="http://schemas.microsoft.com/office/powerpoint/2010/main" val="1295916291"/>
+        <p14:creationId xmlns:p14="http://schemas.microsoft.com/office/powerpoint/2010/main" val="1487107883"/>
       </p:ext>
     </p:extLst>
   </p:cSld>
@@ -8243,17 +8250,8 @@
           <a:p>
             <a:r>
               <a:rPr lang="en-US" dirty="0" smtClean="0"/>
-              <a:t>3.8 </a:t>
-            </a:r>
-            <a:r>
-              <a:rPr lang="en-US" dirty="0" smtClean="0"/>
-              <a:t>years of </a:t>
-            </a:r>
-            <a:r>
-              <a:rPr lang="en-US" dirty="0" smtClean="0"/>
-              <a:t>experience</a:t>
-            </a:r>
-            <a:endParaRPr lang="en-US" dirty="0" smtClean="0"/>
+              <a:t>3.8 years of experience</a:t>
+            </a:r>
           </a:p>
           <a:p>
             <a:pPr lvl="1"/>
@@ -8312,162 +8310,139 @@
         </p:nvSpPr>
         <p:spPr/>
         <p:txBody>
+          <a:bodyPr>
+            <a:normAutofit/>
+          </a:bodyPr>
+          <a:lstStyle/>
+          <a:p>
+            <a:r>
+              <a:rPr lang="en-US" sz="3500" b="1" dirty="0" smtClean="0"/>
+              <a:t>Data Structure </a:t>
+            </a:r>
+            <a:r>
+              <a:rPr lang="en-US" sz="3500" b="1" dirty="0" smtClean="0"/>
+              <a:t>Libraries (Refer relevant notebooks files)</a:t>
+            </a:r>
+            <a:endParaRPr lang="en-US" sz="3500" b="1" dirty="0"/>
+          </a:p>
+        </p:txBody>
+      </p:sp>
+      <p:sp>
+        <p:nvSpPr>
+          <p:cNvPr id="3" name="Content Placeholder 2"/>
+          <p:cNvSpPr>
+            <a:spLocks noGrp="1"/>
+          </p:cNvSpPr>
+          <p:nvPr>
+            <p:ph idx="1"/>
+          </p:nvPr>
+        </p:nvSpPr>
+        <p:spPr/>
+        <p:txBody>
           <a:bodyPr/>
           <a:lstStyle/>
           <a:p>
             <a:r>
+              <a:rPr lang="en-US" dirty="0" err="1" smtClean="0"/>
+              <a:t>NumPy</a:t>
+            </a:r>
+            <a:endParaRPr lang="en-US" dirty="0" smtClean="0"/>
+          </a:p>
+          <a:p>
+            <a:pPr lvl="1"/>
+            <a:r>
               <a:rPr lang="en-US" dirty="0" smtClean="0"/>
-              <a:t>Data Cleaning</a:t>
-            </a:r>
-            <a:endParaRPr lang="en-US" dirty="0"/>
-          </a:p>
-        </p:txBody>
-      </p:sp>
-      <p:sp>
-        <p:nvSpPr>
-          <p:cNvPr id="3" name="Content Placeholder 2"/>
-          <p:cNvSpPr>
-            <a:spLocks noGrp="1"/>
-          </p:cNvSpPr>
-          <p:nvPr>
-            <p:ph idx="1"/>
-          </p:nvPr>
-        </p:nvSpPr>
-        <p:spPr/>
-        <p:txBody>
-          <a:bodyPr/>
-          <a:lstStyle/>
-          <a:p>
-            <a:pPr>
-              <a:lnSpc>
-                <a:spcPct val="100000"/>
-              </a:lnSpc>
-              <a:spcBef>
-                <a:spcPts val="0"/>
-              </a:spcBef>
-            </a:pPr>
+              <a:t>Powerful n-</a:t>
+            </a:r>
+            <a:r>
+              <a:rPr lang="en-US" dirty="0" err="1" smtClean="0"/>
+              <a:t>dimentional</a:t>
+            </a:r>
             <a:r>
               <a:rPr lang="en-US" dirty="0" smtClean="0"/>
-              <a:t>Missing values</a:t>
-            </a:r>
-          </a:p>
-          <a:p>
-            <a:pPr lvl="1">
-              <a:lnSpc>
-                <a:spcPct val="100000"/>
-              </a:lnSpc>
-              <a:spcBef>
-                <a:spcPts val="0"/>
-              </a:spcBef>
-            </a:pPr>
+              <a:t> array object data </a:t>
+            </a:r>
+            <a:r>
+              <a:rPr lang="en-US" dirty="0" err="1" smtClean="0"/>
+              <a:t>sctructure</a:t>
+            </a:r>
+            <a:endParaRPr lang="en-US" dirty="0" smtClean="0"/>
+          </a:p>
+          <a:p>
+            <a:pPr lvl="1"/>
             <a:r>
               <a:rPr lang="en-US" dirty="0" smtClean="0"/>
-              <a:t>System errors preventing the data to get acquired incorrectly</a:t>
-            </a:r>
-          </a:p>
-          <a:p>
-            <a:pPr lvl="1">
-              <a:lnSpc>
-                <a:spcPct val="100000"/>
-              </a:lnSpc>
-              <a:spcBef>
-                <a:spcPts val="0"/>
-              </a:spcBef>
-            </a:pPr>
+              <a:t>Utility functions to work with this data structure</a:t>
+            </a:r>
+          </a:p>
+          <a:p>
+            <a:pPr lvl="2"/>
             <a:r>
               <a:rPr lang="en-US" dirty="0" smtClean="0"/>
-              <a:t>Unavailable attribute values</a:t>
-            </a:r>
-          </a:p>
-          <a:p>
-            <a:pPr lvl="1">
-              <a:lnSpc>
-                <a:spcPct val="100000"/>
-              </a:lnSpc>
-              <a:spcBef>
-                <a:spcPts val="0"/>
-              </a:spcBef>
-            </a:pPr>
+              <a:t>Useful </a:t>
+            </a:r>
+            <a:r>
+              <a:rPr lang="en-US" dirty="0"/>
+              <a:t>linear algebra, Fourier transform, and random number </a:t>
+            </a:r>
             <a:r>
               <a:rPr lang="en-US" dirty="0" smtClean="0"/>
-              <a:t>Non Response</a:t>
-            </a:r>
-          </a:p>
-          <a:p>
-            <a:pPr lvl="1">
-              <a:lnSpc>
-                <a:spcPct val="100000"/>
-              </a:lnSpc>
-              <a:spcBef>
-                <a:spcPts val="0"/>
-              </a:spcBef>
-            </a:pPr>
+              <a:t>capabilities</a:t>
+            </a:r>
+          </a:p>
+          <a:p>
+            <a:r>
+              <a:rPr lang="en-US" dirty="0" smtClean="0"/>
+              <a:t>Pandas</a:t>
+            </a:r>
+          </a:p>
+          <a:p>
+            <a:pPr lvl="1"/>
+            <a:r>
+              <a:rPr lang="en-US" dirty="0" smtClean="0"/>
+              <a:t>Written on the top of </a:t>
+            </a:r>
+            <a:r>
+              <a:rPr lang="en-US" dirty="0" err="1" smtClean="0"/>
+              <a:t>NumPy</a:t>
+            </a:r>
             <a:endParaRPr lang="en-US" dirty="0" smtClean="0"/>
           </a:p>
           <a:p>
-            <a:pPr>
-              <a:lnSpc>
-                <a:spcPct val="100000"/>
-              </a:lnSpc>
-              <a:spcBef>
-                <a:spcPts val="0"/>
-              </a:spcBef>
-            </a:pPr>
+            <a:pPr lvl="1"/>
             <a:r>
               <a:rPr lang="en-US" dirty="0" smtClean="0"/>
-              <a:t>Problems with missing values</a:t>
-            </a:r>
-          </a:p>
-          <a:p>
-            <a:pPr lvl="1">
-              <a:lnSpc>
-                <a:spcPct val="100000"/>
-              </a:lnSpc>
-              <a:spcBef>
-                <a:spcPts val="0"/>
-              </a:spcBef>
-            </a:pPr>
+              <a:t>Series as basic data structure</a:t>
+            </a:r>
+          </a:p>
+          <a:p>
+            <a:pPr lvl="1"/>
+            <a:r>
+              <a:rPr lang="en-US" dirty="0" smtClean="0"/>
+              <a:t>Provides data analysis tools</a:t>
+            </a:r>
+          </a:p>
+          <a:p>
+            <a:pPr lvl="2"/>
             <a:r>
               <a:rPr lang="en-US" dirty="0"/>
-              <a:t>Missing values can lead to false </a:t>
-            </a:r>
-            <a:r>
-              <a:rPr lang="en-US" dirty="0" smtClean="0"/>
-              <a:t>conclusion</a:t>
-            </a:r>
-          </a:p>
-          <a:p>
-            <a:pPr lvl="1">
-              <a:lnSpc>
-                <a:spcPct val="100000"/>
-              </a:lnSpc>
-              <a:spcBef>
-                <a:spcPts val="0"/>
-              </a:spcBef>
-            </a:pPr>
+              <a:t>NA-friendly statistics, </a:t>
+            </a:r>
+            <a:r>
+              <a:rPr lang="en-US" dirty="0" err="1"/>
+              <a:t>groupby</a:t>
+            </a:r>
             <a:r>
               <a:rPr lang="en-US" dirty="0"/>
-              <a:t>It's ok to have random missing values. But systematic missing values are harmful</a:t>
-            </a:r>
-            <a:endParaRPr lang="en-US" dirty="0" smtClean="0"/>
-          </a:p>
-          <a:p>
-            <a:pPr lvl="1">
-              <a:lnSpc>
-                <a:spcPct val="100000"/>
-              </a:lnSpc>
-              <a:spcBef>
-                <a:spcPts val="0"/>
-              </a:spcBef>
-            </a:pPr>
-            <a:endParaRPr lang="en-US" dirty="0"/>
+              <a:t>, merge and join methods, and lots of other conveniences</a:t>
+            </a:r>
           </a:p>
         </p:txBody>
       </p:sp>
     </p:spTree>
     <p:extLst>
       <p:ext uri="{BB962C8B-B14F-4D97-AF65-F5344CB8AC3E}">
-        <p14:creationId xmlns:p14="http://schemas.microsoft.com/office/powerpoint/2010/main" val="1934416608"/>
+        <p14:creationId xmlns:p14="http://schemas.microsoft.com/office/powerpoint/2010/main" val="1295916291"/>
       </p:ext>
     </p:extLst>
   </p:cSld>
@@ -8511,7 +8486,7 @@
           <a:p>
             <a:r>
               <a:rPr lang="en-US" dirty="0" smtClean="0"/>
-              <a:t>Data Cleaning (Contd.)</a:t>
+              <a:t>Data Cleaning</a:t>
             </a:r>
             <a:endParaRPr lang="en-US" dirty="0"/>
           </a:p>
@@ -8532,32 +8507,128 @@
           <a:bodyPr/>
           <a:lstStyle/>
           <a:p>
+            <a:pPr>
+              <a:lnSpc>
+                <a:spcPct val="100000"/>
+              </a:lnSpc>
+              <a:spcBef>
+                <a:spcPts val="0"/>
+              </a:spcBef>
+            </a:pPr>
             <a:r>
               <a:rPr lang="en-US" dirty="0" smtClean="0"/>
-              <a:t>Addressing missing values</a:t>
-            </a:r>
-          </a:p>
-          <a:p>
-            <a:pPr lvl="1"/>
+              <a:t>Missing values</a:t>
+            </a:r>
+          </a:p>
+          <a:p>
+            <a:pPr lvl="1">
+              <a:lnSpc>
+                <a:spcPct val="100000"/>
+              </a:lnSpc>
+              <a:spcBef>
+                <a:spcPts val="0"/>
+              </a:spcBef>
+            </a:pPr>
             <a:r>
               <a:rPr lang="en-US" dirty="0" smtClean="0"/>
-              <a:t>Partial deletion</a:t>
-            </a:r>
-          </a:p>
-          <a:p>
-            <a:pPr lvl="1"/>
-            <a:r>
-              <a:rPr lang="en-US" dirty="0" err="1" smtClean="0"/>
-              <a:t>Impution</a:t>
-            </a:r>
+              <a:t>System errors preventing the data to get acquired incorrectly</a:t>
+            </a:r>
+          </a:p>
+          <a:p>
+            <a:pPr lvl="1">
+              <a:lnSpc>
+                <a:spcPct val="100000"/>
+              </a:lnSpc>
+              <a:spcBef>
+                <a:spcPts val="0"/>
+              </a:spcBef>
+            </a:pPr>
+            <a:r>
+              <a:rPr lang="en-US" dirty="0" smtClean="0"/>
+              <a:t>Unavailable attribute values</a:t>
+            </a:r>
+          </a:p>
+          <a:p>
+            <a:pPr lvl="1">
+              <a:lnSpc>
+                <a:spcPct val="100000"/>
+              </a:lnSpc>
+              <a:spcBef>
+                <a:spcPts val="0"/>
+              </a:spcBef>
+            </a:pPr>
+            <a:r>
+              <a:rPr lang="en-US" dirty="0" smtClean="0"/>
+              <a:t>Non Response</a:t>
+            </a:r>
+          </a:p>
+          <a:p>
+            <a:pPr lvl="1">
+              <a:lnSpc>
+                <a:spcPct val="100000"/>
+              </a:lnSpc>
+              <a:spcBef>
+                <a:spcPts val="0"/>
+              </a:spcBef>
+            </a:pPr>
             <a:endParaRPr lang="en-US" dirty="0" smtClean="0"/>
           </a:p>
           <a:p>
-            <a:pPr lvl="1"/>
+            <a:pPr>
+              <a:lnSpc>
+                <a:spcPct val="100000"/>
+              </a:lnSpc>
+              <a:spcBef>
+                <a:spcPts val="0"/>
+              </a:spcBef>
+            </a:pPr>
+            <a:r>
+              <a:rPr lang="en-US" dirty="0" smtClean="0"/>
+              <a:t>Problems with missing values</a:t>
+            </a:r>
+          </a:p>
+          <a:p>
+            <a:pPr lvl="1">
+              <a:lnSpc>
+                <a:spcPct val="100000"/>
+              </a:lnSpc>
+              <a:spcBef>
+                <a:spcPts val="0"/>
+              </a:spcBef>
+            </a:pPr>
+            <a:r>
+              <a:rPr lang="en-US" dirty="0"/>
+              <a:t>Missing values can lead to false </a:t>
+            </a:r>
+            <a:r>
+              <a:rPr lang="en-US" dirty="0" smtClean="0"/>
+              <a:t>conclusion</a:t>
+            </a:r>
+          </a:p>
+          <a:p>
+            <a:pPr lvl="1">
+              <a:lnSpc>
+                <a:spcPct val="100000"/>
+              </a:lnSpc>
+              <a:spcBef>
+                <a:spcPts val="0"/>
+              </a:spcBef>
+            </a:pPr>
+            <a:r>
+              <a:rPr lang="en-US" dirty="0"/>
+              <a:t>It's ok to have random missing values. But systematic missing values are harmful</a:t>
+            </a:r>
             <a:endParaRPr lang="en-US" dirty="0" smtClean="0"/>
           </a:p>
           <a:p>
-            <a:pPr lvl="1"/>
+            <a:pPr lvl="1">
+              <a:lnSpc>
+                <a:spcPct val="100000"/>
+              </a:lnSpc>
+              <a:spcBef>
+                <a:spcPts val="0"/>
+              </a:spcBef>
+            </a:pPr>
             <a:endParaRPr lang="en-US" dirty="0"/>
           </a:p>
         </p:txBody>
@@ -8565,7 +8636,7 @@
     </p:spTree>
     <p:extLst>
       <p:ext uri="{BB962C8B-B14F-4D97-AF65-F5344CB8AC3E}">
-        <p14:creationId xmlns:p14="http://schemas.microsoft.com/office/powerpoint/2010/main" val="1747346890"/>
+        <p14:creationId xmlns:p14="http://schemas.microsoft.com/office/powerpoint/2010/main" val="1934416608"/>
       </p:ext>
     </p:extLst>
   </p:cSld>
@@ -8609,7 +8680,7 @@
           <a:p>
             <a:r>
               <a:rPr lang="en-US" dirty="0" smtClean="0"/>
-              <a:t>Conclusion and Communication</a:t>
+              <a:t>Data Cleaning (Contd.)</a:t>
             </a:r>
             <a:endParaRPr lang="en-US" dirty="0"/>
           </a:p>
@@ -8632,22 +8703,30 @@
           <a:p>
             <a:r>
               <a:rPr lang="en-US" dirty="0" smtClean="0"/>
-              <a:t>Validate the designed model</a:t>
-            </a:r>
-          </a:p>
-          <a:p>
+              <a:t>Addressing missing values</a:t>
+            </a:r>
+          </a:p>
+          <a:p>
+            <a:pPr lvl="1"/>
             <a:r>
               <a:rPr lang="en-US" dirty="0" smtClean="0"/>
-              <a:t>Communicate the result</a:t>
-            </a:r>
-          </a:p>
-          <a:p>
-            <a:r>
-              <a:rPr lang="en-US" dirty="0" smtClean="0"/>
-              <a:t>Incorporate the model into final product</a:t>
-            </a:r>
-          </a:p>
-          <a:p>
+              <a:t>Partial deletion</a:t>
+            </a:r>
+          </a:p>
+          <a:p>
+            <a:pPr lvl="1"/>
+            <a:r>
+              <a:rPr lang="en-US" dirty="0" err="1" smtClean="0"/>
+              <a:t>Impution</a:t>
+            </a:r>
+            <a:endParaRPr lang="en-US" dirty="0" smtClean="0"/>
+          </a:p>
+          <a:p>
+            <a:pPr lvl="1"/>
+            <a:endParaRPr lang="en-US" dirty="0" smtClean="0"/>
+          </a:p>
+          <a:p>
+            <a:pPr lvl="1"/>
             <a:endParaRPr lang="en-US" dirty="0"/>
           </a:p>
         </p:txBody>
@@ -8655,7 +8734,7 @@
     </p:spTree>
     <p:extLst>
       <p:ext uri="{BB962C8B-B14F-4D97-AF65-F5344CB8AC3E}">
-        <p14:creationId xmlns:p14="http://schemas.microsoft.com/office/powerpoint/2010/main" val="1668685498"/>
+        <p14:creationId xmlns:p14="http://schemas.microsoft.com/office/powerpoint/2010/main" val="1747346890"/>
       </p:ext>
     </p:extLst>
   </p:cSld>
@@ -8699,7 +8778,7 @@
           <a:p>
             <a:r>
               <a:rPr lang="en-US" dirty="0" smtClean="0"/>
-              <a:t>Useful resources</a:t>
+              <a:t>Conclusion and Communication</a:t>
             </a:r>
             <a:endParaRPr lang="en-US" dirty="0"/>
           </a:p>
@@ -8717,114 +8796,27 @@
         </p:nvSpPr>
         <p:spPr/>
         <p:txBody>
-          <a:bodyPr>
-            <a:normAutofit fontScale="92500" lnSpcReduction="20000"/>
-          </a:bodyPr>
+          <a:bodyPr/>
           <a:lstStyle/>
           <a:p>
             <a:r>
               <a:rPr lang="en-US" dirty="0" smtClean="0"/>
-              <a:t>Questions</a:t>
-            </a:r>
-          </a:p>
-          <a:p>
-            <a:pPr lvl="1"/>
+              <a:t>Validate the designed model</a:t>
+            </a:r>
+          </a:p>
+          <a:p>
             <a:r>
               <a:rPr lang="en-US" dirty="0" smtClean="0"/>
-              <a:t>Google</a:t>
-            </a:r>
-          </a:p>
-          <a:p>
-            <a:pPr lvl="1"/>
+              <a:t>Communicate the result</a:t>
+            </a:r>
+          </a:p>
+          <a:p>
             <a:r>
               <a:rPr lang="en-US" dirty="0" smtClean="0"/>
-              <a:t>Stack overflow</a:t>
-            </a:r>
-          </a:p>
-          <a:p>
-            <a:pPr lvl="1"/>
-            <a:r>
-              <a:rPr lang="en-US" dirty="0" smtClean="0"/>
-              <a:t>Library documentation </a:t>
-            </a:r>
-          </a:p>
-          <a:p>
-            <a:pPr lvl="2"/>
-            <a:r>
-              <a:rPr lang="en-US" dirty="0" smtClean="0"/>
-              <a:t>even the in-built documentation in IDE</a:t>
-            </a:r>
-          </a:p>
-          <a:p>
-            <a:r>
-              <a:rPr lang="en-US" dirty="0" smtClean="0"/>
-              <a:t>Online courses</a:t>
-            </a:r>
-          </a:p>
-          <a:p>
-            <a:pPr lvl="1"/>
-            <a:r>
-              <a:rPr lang="en-US" dirty="0" err="1" smtClean="0">
-                <a:hlinkClick r:id="rId2"/>
-              </a:rPr>
-              <a:t>Udacity</a:t>
-            </a:r>
-            <a:endParaRPr lang="en-US" dirty="0" smtClean="0"/>
-          </a:p>
-          <a:p>
-            <a:pPr lvl="1"/>
-            <a:r>
-              <a:rPr lang="en-US" dirty="0" smtClean="0">
-                <a:hlinkClick r:id="rId3"/>
-              </a:rPr>
-              <a:t>Coursera</a:t>
-            </a:r>
-            <a:endParaRPr lang="en-US" dirty="0" smtClean="0"/>
-          </a:p>
-          <a:p>
-            <a:pPr lvl="1"/>
-            <a:r>
-              <a:rPr lang="en-US" dirty="0" smtClean="0">
-                <a:hlinkClick r:id="rId4"/>
-              </a:rPr>
-              <a:t>Dataschool</a:t>
-            </a:r>
-            <a:endParaRPr lang="en-US" dirty="0" smtClean="0"/>
-          </a:p>
-          <a:p>
-            <a:r>
-              <a:rPr lang="en-US" dirty="0" smtClean="0"/>
-              <a:t>Competitions</a:t>
-            </a:r>
-          </a:p>
-          <a:p>
-            <a:pPr lvl="1"/>
-            <a:r>
-              <a:rPr lang="en-US" dirty="0" smtClean="0">
-                <a:hlinkClick r:id="rId5"/>
-              </a:rPr>
-              <a:t>Kaggle</a:t>
-            </a:r>
-            <a:endParaRPr lang="en-US" dirty="0" smtClean="0"/>
-          </a:p>
-          <a:p>
-            <a:r>
-              <a:rPr lang="en-US" dirty="0" smtClean="0"/>
-              <a:t>Books</a:t>
-            </a:r>
-          </a:p>
-          <a:p>
-            <a:pPr lvl="1"/>
-            <a:r>
-              <a:rPr lang="en-US" dirty="0" smtClean="0">
-                <a:hlinkClick r:id="rId6"/>
-              </a:rPr>
-              <a:t>Introduction to Machine Learning with Python</a:t>
-            </a:r>
-            <a:endParaRPr lang="en-US" dirty="0" smtClean="0"/>
-          </a:p>
-          <a:p>
-            <a:pPr lvl="1"/>
+              <a:t>Incorporate the model into final product</a:t>
+            </a:r>
+          </a:p>
+          <a:p>
             <a:endParaRPr lang="en-US" dirty="0"/>
           </a:p>
         </p:txBody>
@@ -8832,20 +8824,13 @@
     </p:spTree>
     <p:extLst>
       <p:ext uri="{BB962C8B-B14F-4D97-AF65-F5344CB8AC3E}">
-        <p14:creationId xmlns:p14="http://schemas.microsoft.com/office/powerpoint/2010/main" val="464928031"/>
+        <p14:creationId xmlns:p14="http://schemas.microsoft.com/office/powerpoint/2010/main" val="1668685498"/>
       </p:ext>
     </p:extLst>
   </p:cSld>
   <p:clrMapOvr>
     <a:masterClrMapping/>
   </p:clrMapOvr>
-  <p:timing>
-    <p:tnLst>
-      <p:par>
-        <p:cTn id="1" dur="indefinite" restart="never" nodeType="tmRoot"/>
-      </p:par>
-    </p:tnLst>
-  </p:timing>
 </p:sld>
 </file>
 
@@ -8883,7 +8868,7 @@
           <a:p>
             <a:r>
               <a:rPr lang="en-US" dirty="0" smtClean="0"/>
-              <a:t>References</a:t>
+              <a:t>Useful resources</a:t>
             </a:r>
             <a:endParaRPr lang="en-US" dirty="0"/>
           </a:p>
@@ -8901,109 +8886,122 @@
         </p:nvSpPr>
         <p:spPr/>
         <p:txBody>
-          <a:bodyPr/>
+          <a:bodyPr>
+            <a:normAutofit fontScale="92500" lnSpcReduction="20000"/>
+          </a:bodyPr>
           <a:lstStyle/>
           <a:p>
             <a:r>
-              <a:rPr lang="en-US" dirty="0" err="1" smtClean="0"/>
-              <a:t>Udacity</a:t>
-            </a:r>
-            <a:r>
               <a:rPr lang="en-US" dirty="0" smtClean="0"/>
-              <a:t> courses</a:t>
+              <a:t>Questions</a:t>
             </a:r>
           </a:p>
           <a:p>
             <a:pPr lvl="1"/>
             <a:r>
-              <a:rPr lang="en-US" dirty="0">
+              <a:rPr lang="en-US" dirty="0" smtClean="0"/>
+              <a:t>Google</a:t>
+            </a:r>
+          </a:p>
+          <a:p>
+            <a:pPr lvl="1"/>
+            <a:r>
+              <a:rPr lang="en-US" dirty="0" smtClean="0"/>
+              <a:t>Stack overflow</a:t>
+            </a:r>
+          </a:p>
+          <a:p>
+            <a:pPr lvl="1"/>
+            <a:r>
+              <a:rPr lang="en-US" dirty="0" smtClean="0"/>
+              <a:t>Library documentation </a:t>
+            </a:r>
+          </a:p>
+          <a:p>
+            <a:pPr lvl="2"/>
+            <a:r>
+              <a:rPr lang="en-US" dirty="0" smtClean="0"/>
+              <a:t>even the in-built documentation in IDE</a:t>
+            </a:r>
+          </a:p>
+          <a:p>
+            <a:r>
+              <a:rPr lang="en-US" dirty="0" smtClean="0"/>
+              <a:t>Online courses</a:t>
+            </a:r>
+          </a:p>
+          <a:p>
+            <a:pPr lvl="1"/>
+            <a:r>
+              <a:rPr lang="en-US" dirty="0" err="1" smtClean="0">
                 <a:hlinkClick r:id="rId2"/>
               </a:rPr>
-              <a:t>https://</a:t>
-            </a:r>
-            <a:r>
-              <a:rPr lang="en-US" dirty="0" smtClean="0">
-                <a:hlinkClick r:id="rId2"/>
-              </a:rPr>
-              <a:t>classroom.udacity.com/courses/ud170</a:t>
+              <a:t>Udacity</a:t>
             </a:r>
             <a:endParaRPr lang="en-US" dirty="0" smtClean="0"/>
           </a:p>
           <a:p>
             <a:pPr lvl="1"/>
-            <a:r>
-              <a:rPr lang="en-US" dirty="0">
-                <a:hlinkClick r:id="rId3"/>
-              </a:rPr>
-              <a:t>https://</a:t>
-            </a:r>
             <a:r>
               <a:rPr lang="en-US" dirty="0" smtClean="0">
                 <a:hlinkClick r:id="rId3"/>
               </a:rPr>
-              <a:t>classroom.udacity.com/courses/ud359</a:t>
+              <a:t>Coursera</a:t>
             </a:r>
             <a:endParaRPr lang="en-US" dirty="0" smtClean="0"/>
           </a:p>
           <a:p>
-            <a:r>
-              <a:rPr lang="en-US" dirty="0" err="1" smtClean="0"/>
-              <a:t>Dataschool</a:t>
-            </a:r>
-            <a:r>
-              <a:rPr lang="en-US" dirty="0"/>
-              <a:t> </a:t>
-            </a:r>
-            <a:r>
-              <a:rPr lang="en-US" dirty="0" smtClean="0"/>
-              <a:t>( </a:t>
-            </a:r>
+            <a:pPr lvl="1"/>
             <a:r>
               <a:rPr lang="en-US" dirty="0" smtClean="0">
                 <a:hlinkClick r:id="rId4"/>
               </a:rPr>
-              <a:t>http</a:t>
-            </a:r>
-            <a:r>
-              <a:rPr lang="en-US" dirty="0">
-                <a:hlinkClick r:id="rId4"/>
+              <a:t>Dataschool</a:t>
+            </a:r>
+            <a:endParaRPr lang="en-US" dirty="0" smtClean="0"/>
+          </a:p>
+          <a:p>
+            <a:r>
+              <a:rPr lang="en-US" dirty="0" smtClean="0"/>
+              <a:t>Competitions</a:t>
+            </a:r>
+          </a:p>
+          <a:p>
+            <a:pPr lvl="1"/>
+            <a:r>
+              <a:rPr lang="en-US" dirty="0" smtClean="0">
+                <a:hlinkClick r:id="rId5"/>
               </a:rPr>
-              <a:t>://www.dataschool.io</a:t>
-            </a:r>
+              <a:t>Kaggle</a:t>
+            </a:r>
+            <a:endParaRPr lang="en-US" dirty="0" smtClean="0"/>
+          </a:p>
+          <a:p>
+            <a:r>
+              <a:rPr lang="en-US" dirty="0" smtClean="0"/>
+              <a:t>Books</a:t>
+            </a:r>
+          </a:p>
+          <a:p>
+            <a:pPr lvl="1"/>
             <a:r>
               <a:rPr lang="en-US" dirty="0" smtClean="0">
-                <a:hlinkClick r:id="rId4"/>
+                <a:hlinkClick r:id="rId6"/>
               </a:rPr>
-              <a:t>/</a:t>
-            </a:r>
-            <a:r>
-              <a:rPr lang="en-US" dirty="0" smtClean="0"/>
-              <a:t> )</a:t>
-            </a:r>
-          </a:p>
-          <a:p>
-            <a:r>
-              <a:rPr lang="en-US" dirty="0" err="1" smtClean="0"/>
-              <a:t>Scikit</a:t>
-            </a:r>
-            <a:r>
-              <a:rPr lang="en-US" dirty="0"/>
-              <a:t>-</a:t>
-            </a:r>
-            <a:r>
-              <a:rPr lang="en-US" dirty="0" smtClean="0"/>
-              <a:t>learn documentation</a:t>
-            </a:r>
-          </a:p>
-          <a:p>
+              <a:t>Introduction to Machine Learning with Python</a:t>
+            </a:r>
             <a:endParaRPr lang="en-US" dirty="0" smtClean="0"/>
+          </a:p>
+          <a:p>
+            <a:pPr lvl="1"/>
+            <a:endParaRPr lang="en-US" dirty="0"/>
           </a:p>
         </p:txBody>
       </p:sp>
     </p:spTree>
     <p:extLst>
       <p:ext uri="{BB962C8B-B14F-4D97-AF65-F5344CB8AC3E}">
-        <p14:creationId xmlns:p14="http://schemas.microsoft.com/office/powerpoint/2010/main" val="102611754"/>
+        <p14:creationId xmlns:p14="http://schemas.microsoft.com/office/powerpoint/2010/main" val="464928031"/>
       </p:ext>
     </p:extLst>
   </p:cSld>
@@ -9054,6 +9052,177 @@
           <a:p>
             <a:r>
               <a:rPr lang="en-US" dirty="0" smtClean="0"/>
+              <a:t>References</a:t>
+            </a:r>
+            <a:endParaRPr lang="en-US" dirty="0"/>
+          </a:p>
+        </p:txBody>
+      </p:sp>
+      <p:sp>
+        <p:nvSpPr>
+          <p:cNvPr id="3" name="Content Placeholder 2"/>
+          <p:cNvSpPr>
+            <a:spLocks noGrp="1"/>
+          </p:cNvSpPr>
+          <p:nvPr>
+            <p:ph idx="1"/>
+          </p:nvPr>
+        </p:nvSpPr>
+        <p:spPr/>
+        <p:txBody>
+          <a:bodyPr/>
+          <a:lstStyle/>
+          <a:p>
+            <a:r>
+              <a:rPr lang="en-US" dirty="0" err="1" smtClean="0"/>
+              <a:t>Udacity</a:t>
+            </a:r>
+            <a:r>
+              <a:rPr lang="en-US" dirty="0" smtClean="0"/>
+              <a:t> courses</a:t>
+            </a:r>
+          </a:p>
+          <a:p>
+            <a:pPr lvl="1"/>
+            <a:r>
+              <a:rPr lang="en-US" dirty="0">
+                <a:hlinkClick r:id="rId2"/>
+              </a:rPr>
+              <a:t>https://</a:t>
+            </a:r>
+            <a:r>
+              <a:rPr lang="en-US" dirty="0" smtClean="0">
+                <a:hlinkClick r:id="rId2"/>
+              </a:rPr>
+              <a:t>classroom.udacity.com/courses/ud170</a:t>
+            </a:r>
+            <a:endParaRPr lang="en-US" dirty="0" smtClean="0"/>
+          </a:p>
+          <a:p>
+            <a:pPr lvl="1"/>
+            <a:r>
+              <a:rPr lang="en-US" dirty="0">
+                <a:hlinkClick r:id="rId3"/>
+              </a:rPr>
+              <a:t>https://</a:t>
+            </a:r>
+            <a:r>
+              <a:rPr lang="en-US" dirty="0" smtClean="0">
+                <a:hlinkClick r:id="rId3"/>
+              </a:rPr>
+              <a:t>classroom.udacity.com/courses/ud359</a:t>
+            </a:r>
+            <a:endParaRPr lang="en-US" dirty="0" smtClean="0"/>
+          </a:p>
+          <a:p>
+            <a:r>
+              <a:rPr lang="en-US" dirty="0" err="1" smtClean="0"/>
+              <a:t>Dataschool</a:t>
+            </a:r>
+            <a:r>
+              <a:rPr lang="en-US" dirty="0"/>
+              <a:t> </a:t>
+            </a:r>
+            <a:r>
+              <a:rPr lang="en-US" dirty="0" smtClean="0"/>
+              <a:t>( </a:t>
+            </a:r>
+            <a:r>
+              <a:rPr lang="en-US" dirty="0" smtClean="0">
+                <a:hlinkClick r:id="rId4"/>
+              </a:rPr>
+              <a:t>http</a:t>
+            </a:r>
+            <a:r>
+              <a:rPr lang="en-US" dirty="0">
+                <a:hlinkClick r:id="rId4"/>
+              </a:rPr>
+              <a:t>://www.dataschool.io</a:t>
+            </a:r>
+            <a:r>
+              <a:rPr lang="en-US" dirty="0" smtClean="0">
+                <a:hlinkClick r:id="rId4"/>
+              </a:rPr>
+              <a:t>/</a:t>
+            </a:r>
+            <a:r>
+              <a:rPr lang="en-US" dirty="0" smtClean="0"/>
+              <a:t> )</a:t>
+            </a:r>
+          </a:p>
+          <a:p>
+            <a:r>
+              <a:rPr lang="en-US" dirty="0" err="1" smtClean="0"/>
+              <a:t>Scikit</a:t>
+            </a:r>
+            <a:r>
+              <a:rPr lang="en-US" dirty="0"/>
+              <a:t>-</a:t>
+            </a:r>
+            <a:r>
+              <a:rPr lang="en-US" dirty="0" smtClean="0"/>
+              <a:t>learn documentation</a:t>
+            </a:r>
+          </a:p>
+          <a:p>
+            <a:endParaRPr lang="en-US" dirty="0" smtClean="0"/>
+          </a:p>
+        </p:txBody>
+      </p:sp>
+    </p:spTree>
+    <p:extLst>
+      <p:ext uri="{BB962C8B-B14F-4D97-AF65-F5344CB8AC3E}">
+        <p14:creationId xmlns:p14="http://schemas.microsoft.com/office/powerpoint/2010/main" val="102611754"/>
+      </p:ext>
+    </p:extLst>
+  </p:cSld>
+  <p:clrMapOvr>
+    <a:masterClrMapping/>
+  </p:clrMapOvr>
+  <p:timing>
+    <p:tnLst>
+      <p:par>
+        <p:cTn id="1" dur="indefinite" restart="never" nodeType="tmRoot"/>
+      </p:par>
+    </p:tnLst>
+  </p:timing>
+</p:sld>
+</file>
+
+<file path=ppt/slides/slide26.xml><?xml version="1.0" encoding="utf-8"?>
+<p:sld xmlns:a="http://schemas.openxmlformats.org/drawingml/2006/main" xmlns:r="http://schemas.openxmlformats.org/officeDocument/2006/relationships" xmlns:p="http://schemas.openxmlformats.org/presentationml/2006/main">
+  <p:cSld>
+    <p:spTree>
+      <p:nvGrpSpPr>
+        <p:cNvPr id="1" name=""/>
+        <p:cNvGrpSpPr/>
+        <p:nvPr/>
+      </p:nvGrpSpPr>
+      <p:grpSpPr>
+        <a:xfrm>
+          <a:off x="0" y="0"/>
+          <a:ext cx="0" cy="0"/>
+          <a:chOff x="0" y="0"/>
+          <a:chExt cx="0" cy="0"/>
+        </a:xfrm>
+      </p:grpSpPr>
+      <p:sp>
+        <p:nvSpPr>
+          <p:cNvPr id="2" name="Title 1"/>
+          <p:cNvSpPr>
+            <a:spLocks noGrp="1"/>
+          </p:cNvSpPr>
+          <p:nvPr>
+            <p:ph type="title"/>
+          </p:nvPr>
+        </p:nvSpPr>
+        <p:spPr/>
+        <p:txBody>
+          <a:bodyPr/>
+          <a:lstStyle/>
+          <a:p>
+            <a:r>
+              <a:rPr lang="en-US" dirty="0" smtClean="0"/>
               <a:t>Resources to get started with ML</a:t>
             </a:r>
             <a:endParaRPr lang="en-US" dirty="0"/>
@@ -9128,7 +9297,7 @@
 </p:sld>
 </file>
 
-<file path=ppt/slides/slide26.xml><?xml version="1.0" encoding="utf-8"?>
+<file path=ppt/slides/slide27.xml><?xml version="1.0" encoding="utf-8"?>
 <p:sld xmlns:a="http://schemas.openxmlformats.org/drawingml/2006/main" xmlns:r="http://schemas.openxmlformats.org/officeDocument/2006/relationships" xmlns:p="http://schemas.openxmlformats.org/presentationml/2006/main">
   <p:cSld>
     <p:spTree>
@@ -9558,8 +9727,8 @@
           </a:xfrm>
         </p:spPr>
       </p:pic>
-      <mc:AlternateContent xmlns:mc="http://schemas.openxmlformats.org/markup-compatibility/2006">
-        <mc:Choice xmlns:a14="http://schemas.microsoft.com/office/drawing/2010/main" Requires="a14">
+      <mc:AlternateContent xmlns:mc="http://schemas.openxmlformats.org/markup-compatibility/2006" xmlns:a14="http://schemas.microsoft.com/office/drawing/2010/main">
+        <mc:Choice Requires="a14">
           <p:sp>
             <p:nvSpPr>
               <p:cNvPr id="5" name="TextBox 4"/>
@@ -9582,6 +9751,7 @@
               </a:bodyPr>
               <a:lstStyle/>
               <a:p>
+                <a:pPr/>
                 <a14:m>
                   <m:oMathPara xmlns:m="http://schemas.openxmlformats.org/officeDocument/2006/math">
                     <m:oMathParaPr>
@@ -9626,7 +9796,7 @@
             </p:txBody>
           </p:sp>
         </mc:Choice>
-        <mc:Fallback>
+        <mc:Fallback xmlns="">
           <p:sp>
             <p:nvSpPr>
               <p:cNvPr id="5" name="TextBox 4"/>

</xml_diff>